<commit_message>
reformatted one slide for consistency
</commit_message>
<xml_diff>
--- a/PowerPoints/05 - Lexical Analysis.pptx
+++ b/PowerPoints/05 - Lexical Analysis.pptx
@@ -12,7 +12,7 @@
   </p:handoutMasterIdLst>
   <p:sldIdLst>
     <p:sldId id="256" r:id="rId2"/>
-    <p:sldId id="363" r:id="rId3"/>
+    <p:sldId id="368" r:id="rId3"/>
     <p:sldId id="257" r:id="rId4"/>
     <p:sldId id="261" r:id="rId5"/>
     <p:sldId id="268" r:id="rId6"/>
@@ -9172,16 +9172,26 @@
             </a:r>
           </a:p>
           <a:p>
-            <a:pPr lvl="2"/>
+            <a:pPr marL="914400" lvl="2" indent="0">
+              <a:buNone/>
+            </a:pPr>
             <a:r>
               <a:rPr lang="en-US" dirty="0">
                 <a:latin typeface="Consolas" panose="020B0609020204030204" pitchFamily="49" charset="0"/>
               </a:rPr>
-              <a:t>Position		•  Source</a:t>
-            </a:r>
-          </a:p>
-          <a:p>
-            <a:pPr lvl="2"/>
+              <a:t>• Position		 • Source</a:t>
+            </a:r>
+          </a:p>
+          <a:p>
+            <a:pPr marL="914400" lvl="2" indent="0">
+              <a:buNone/>
+            </a:pPr>
+            <a:r>
+              <a:rPr lang="en-US" dirty="0">
+                <a:latin typeface="Consolas" panose="020B0609020204030204" pitchFamily="49" charset="0"/>
+              </a:rPr>
+              <a:t>• </a:t>
+            </a:r>
             <a:r>
               <a:rPr lang="en-US" dirty="0" err="1">
                 <a:latin typeface="Consolas" panose="020B0609020204030204" pitchFamily="49" charset="0"/>
@@ -9192,7 +9202,7 @@
               <a:rPr lang="en-US" dirty="0">
                 <a:latin typeface="Consolas" panose="020B0609020204030204" pitchFamily="49" charset="0"/>
               </a:rPr>
-              <a:t>	•  </a:t>
+              <a:t>	 • </a:t>
             </a:r>
             <a:r>
               <a:rPr lang="en-US" dirty="0" err="1">
@@ -9205,7 +9215,15 @@
             </a:endParaRPr>
           </a:p>
           <a:p>
-            <a:pPr lvl="2"/>
+            <a:pPr marL="914400" lvl="2" indent="0">
+              <a:buNone/>
+            </a:pPr>
+            <a:r>
+              <a:rPr lang="en-US" dirty="0">
+                <a:latin typeface="Consolas" panose="020B0609020204030204" pitchFamily="49" charset="0"/>
+              </a:rPr>
+              <a:t>• </a:t>
+            </a:r>
             <a:r>
               <a:rPr lang="en-US" dirty="0" err="1">
                 <a:latin typeface="Consolas" panose="020B0609020204030204" pitchFamily="49" charset="0"/>
@@ -9234,10 +9252,14 @@
             </a:r>
           </a:p>
           <a:p>
-            <a:pPr lvl="2"/>
-            <a:r>
-              <a:rPr lang="en-US" dirty="0"/>
-              <a:t>Symbol		•  Token</a:t>
+            <a:pPr marL="914400" lvl="2" indent="0">
+              <a:buNone/>
+            </a:pPr>
+            <a:r>
+              <a:rPr lang="en-US" dirty="0">
+                <a:latin typeface="Consolas" panose="020B0609020204030204" pitchFamily="49" charset="0"/>
+              </a:rPr>
+              <a:t>• Symbol		 • Token</a:t>
             </a:r>
           </a:p>
         </p:txBody>
@@ -9317,7 +9339,7 @@
     </p:spTree>
     <p:extLst>
       <p:ext uri="{BB962C8B-B14F-4D97-AF65-F5344CB8AC3E}">
-        <p14:creationId xmlns:p14="http://schemas.microsoft.com/office/powerpoint/2010/main" val="840970868"/>
+        <p14:creationId xmlns:p14="http://schemas.microsoft.com/office/powerpoint/2010/main" val="2664064205"/>
       </p:ext>
     </p:extLst>
   </p:cSld>

</xml_diff>

<commit_message>
modifications to a couple of PowerPoint slides
</commit_message>
<xml_diff>
--- a/PowerPoints/05 - Lexical Analysis.pptx
+++ b/PowerPoints/05 - Lexical Analysis.pptx
@@ -15880,7 +15880,7 @@
           <a:p>
             <a:r>
               <a:rPr lang="en-US" dirty="0"/>
-              <a:t>Scanning a Hexadecimal Literal</a:t>
+              <a:t>Scanning a Binary Literal</a:t>
             </a:r>
           </a:p>
         </p:txBody>
@@ -15903,8 +15903,8 @@
         </p:nvSpPr>
         <p:spPr>
           <a:xfrm>
-            <a:off x="381000" y="1363663"/>
-            <a:ext cx="8321040" cy="4935537"/>
+            <a:off x="289560" y="1363663"/>
+            <a:ext cx="8778240" cy="4935537"/>
           </a:xfrm>
         </p:spPr>
         <p:txBody>
@@ -15927,7 +15927,7 @@
               <a:rPr lang="en-US" sz="1750" dirty="0" err="1">
                 <a:latin typeface="Consolas" panose="020B0609020204030204" pitchFamily="49" charset="0"/>
               </a:rPr>
-              <a:t>scanHexLiteral</a:t>
+              <a:t>scanBinaryLiteral</a:t>
             </a:r>
             <a:r>
               <a:rPr lang="en-US" sz="1750" dirty="0">
@@ -15994,7 +15994,7 @@
               <a:rPr lang="en-US" sz="1750" dirty="0">
                 <a:latin typeface="Consolas" panose="020B0609020204030204" pitchFamily="49" charset="0"/>
               </a:rPr>
-              <a:t> contains "0X"</a:t>
+              <a:t> contains "0B"</a:t>
             </a:r>
           </a:p>
           <a:p>
@@ -16020,33 +16020,19 @@
               <a:rPr lang="en-US" sz="1750" dirty="0">
                 <a:latin typeface="Consolas" panose="020B0609020204030204" pitchFamily="49" charset="0"/>
               </a:rPr>
-              <a:t>(0) == '0'</a:t>
-            </a:r>
-          </a:p>
-          <a:p>
-            <a:pPr marL="0" indent="0">
-              <a:spcBef>
-                <a:spcPts val="100"/>
-              </a:spcBef>
-              <a:buNone/>
-            </a:pPr>
+              <a:t>(0) == '0' &amp;&amp; </a:t>
+            </a:r>
+            <a:r>
+              <a:rPr lang="en-US" sz="1750" dirty="0" err="1">
+                <a:latin typeface="Consolas" panose="020B0609020204030204" pitchFamily="49" charset="0"/>
+              </a:rPr>
+              <a:t>scanBuffer.charAt</a:t>
+            </a:r>
             <a:r>
               <a:rPr lang="en-US" sz="1750" dirty="0">
                 <a:latin typeface="Consolas" panose="020B0609020204030204" pitchFamily="49" charset="0"/>
               </a:rPr>
-              <a:t>        &amp;&amp; </a:t>
-            </a:r>
-            <a:r>
-              <a:rPr lang="en-US" sz="1750" dirty="0" err="1">
-                <a:latin typeface="Consolas" panose="020B0609020204030204" pitchFamily="49" charset="0"/>
-              </a:rPr>
-              <a:t>scanBuffer.charAt</a:t>
-            </a:r>
-            <a:r>
-              <a:rPr lang="en-US" sz="1750" dirty="0">
-                <a:latin typeface="Consolas" panose="020B0609020204030204" pitchFamily="49" charset="0"/>
-              </a:rPr>
-              <a:t>(1) == 'X';</a:t>
+              <a:t>(1) == 'B';</a:t>
             </a:r>
           </a:p>
           <a:p>
@@ -16071,7 +16057,7 @@
               <a:rPr lang="en-US" sz="1750" dirty="0">
                 <a:latin typeface="Consolas" panose="020B0609020204030204" pitchFamily="49" charset="0"/>
               </a:rPr>
-              <a:t>    // check that the next character is a hex digit</a:t>
+              <a:t>    // check that the next character is a binary digit</a:t>
             </a:r>
           </a:p>
           <a:p>
@@ -16091,7 +16077,7 @@
               <a:rPr lang="en-US" sz="1750" dirty="0" err="1">
                 <a:latin typeface="Consolas" panose="020B0609020204030204" pitchFamily="49" charset="0"/>
               </a:rPr>
-              <a:t>CharUtil.isHexDigit</a:t>
+              <a:t>CharUtil.isBinaryDigit</a:t>
             </a:r>
             <a:r>
               <a:rPr lang="en-US" sz="1750" dirty="0">
@@ -16123,7 +16109,7 @@
               <a:rPr lang="en-US" sz="1750" dirty="0">
                 <a:latin typeface="Consolas" panose="020B0609020204030204" pitchFamily="49" charset="0"/>
               </a:rPr>
-              <a:t>        throw error("Improperly formed hexadecimal literal.");</a:t>
+              <a:t>        throw error("Improperly formed binary literal.");</a:t>
             </a:r>
           </a:p>
           <a:p>
@@ -16260,7 +16246,7 @@
               <a:rPr lang="en-US" sz="1750" dirty="0" err="1">
                 <a:latin typeface="Consolas" panose="020B0609020204030204" pitchFamily="49" charset="0"/>
               </a:rPr>
-              <a:t>CharUtil.isHexDigit</a:t>
+              <a:t>CharUtil.isBinaryDigit</a:t>
             </a:r>
             <a:r>
               <a:rPr lang="en-US" sz="1750" dirty="0">

</xml_diff>